<commit_message>
Revised 1 through 4
Updated lectures 1 through 4
</commit_message>
<xml_diff>
--- a/lecture-02/slides.pptx
+++ b/lecture-02/slides.pptx
@@ -5,7 +5,7 @@
     <p:sldMasterId id="2147483648" r:id="rId1"/>
   </p:sldMasterIdLst>
   <p:notesMasterIdLst>
-    <p:notesMasterId r:id="rId59"/>
+    <p:notesMasterId r:id="rId60"/>
   </p:notesMasterIdLst>
   <p:sldIdLst>
     <p:sldId id="256" r:id="rId2"/>
@@ -65,6 +65,7 @@
     <p:sldId id="319" r:id="rId56"/>
     <p:sldId id="322" r:id="rId57"/>
     <p:sldId id="330" r:id="rId58"/>
+    <p:sldId id="388" r:id="rId59"/>
   </p:sldIdLst>
   <p:sldSz cx="12192000" cy="6858000"/>
   <p:notesSz cx="6858000" cy="9144000"/>
@@ -225,6 +226,7 @@
             <p14:sldId id="319"/>
             <p14:sldId id="322"/>
             <p14:sldId id="330"/>
+            <p14:sldId id="388"/>
           </p14:sldIdLst>
         </p14:section>
       </p14:sectionLst>
@@ -318,7 +320,7 @@
           <a:p>
             <a:fld id="{18E57C98-52D9-9D49-A4E0-A36F13E19F71}" type="datetimeFigureOut">
               <a:rPr lang="en-US" smtClean="0"/>
-              <a:t>1/28/17</a:t>
+              <a:t>10/30/17</a:t>
             </a:fld>
             <a:endParaRPr lang="en-US"/>
           </a:p>
@@ -5056,6 +5058,90 @@
 </p:notes>
 </file>
 
+<file path=ppt/notesSlides/notesSlide58.xml><?xml version="1.0" encoding="utf-8"?>
+<p:notes xmlns:a="http://schemas.openxmlformats.org/drawingml/2006/main" xmlns:r="http://schemas.openxmlformats.org/officeDocument/2006/relationships" xmlns:p="http://schemas.openxmlformats.org/presentationml/2006/main">
+  <p:cSld>
+    <p:spTree>
+      <p:nvGrpSpPr>
+        <p:cNvPr id="1" name=""/>
+        <p:cNvGrpSpPr/>
+        <p:nvPr/>
+      </p:nvGrpSpPr>
+      <p:grpSpPr>
+        <a:xfrm>
+          <a:off x="0" y="0"/>
+          <a:ext cx="0" cy="0"/>
+          <a:chOff x="0" y="0"/>
+          <a:chExt cx="0" cy="0"/>
+        </a:xfrm>
+      </p:grpSpPr>
+      <p:sp>
+        <p:nvSpPr>
+          <p:cNvPr id="2" name="Slide Image Placeholder 1"/>
+          <p:cNvSpPr>
+            <a:spLocks noGrp="1" noRot="1" noChangeAspect="1"/>
+          </p:cNvSpPr>
+          <p:nvPr>
+            <p:ph type="sldImg"/>
+          </p:nvPr>
+        </p:nvSpPr>
+        <p:spPr/>
+      </p:sp>
+      <p:sp>
+        <p:nvSpPr>
+          <p:cNvPr id="3" name="Notes Placeholder 2"/>
+          <p:cNvSpPr>
+            <a:spLocks noGrp="1"/>
+          </p:cNvSpPr>
+          <p:nvPr>
+            <p:ph type="body" idx="1"/>
+          </p:nvPr>
+        </p:nvSpPr>
+        <p:spPr/>
+        <p:txBody>
+          <a:bodyPr/>
+          <a:lstStyle/>
+          <a:p>
+            <a:endParaRPr lang="en-US" dirty="0"/>
+          </a:p>
+        </p:txBody>
+      </p:sp>
+      <p:sp>
+        <p:nvSpPr>
+          <p:cNvPr id="4" name="Slide Number Placeholder 3"/>
+          <p:cNvSpPr>
+            <a:spLocks noGrp="1"/>
+          </p:cNvSpPr>
+          <p:nvPr>
+            <p:ph type="sldNum" sz="quarter" idx="10"/>
+          </p:nvPr>
+        </p:nvSpPr>
+        <p:spPr/>
+        <p:txBody>
+          <a:bodyPr/>
+          <a:lstStyle/>
+          <a:p>
+            <a:fld id="{1D5984C4-F11A-1543-9F4C-C2CEF3F8F86E}" type="slidenum">
+              <a:rPr lang="en-US" smtClean="0"/>
+              <a:t>58</a:t>
+            </a:fld>
+            <a:endParaRPr lang="en-US"/>
+          </a:p>
+        </p:txBody>
+      </p:sp>
+    </p:spTree>
+    <p:extLst>
+      <p:ext uri="{BB962C8B-B14F-4D97-AF65-F5344CB8AC3E}">
+        <p14:creationId xmlns:p14="http://schemas.microsoft.com/office/powerpoint/2010/main" val="1490487537"/>
+      </p:ext>
+    </p:extLst>
+  </p:cSld>
+  <p:clrMapOvr>
+    <a:masterClrMapping/>
+  </p:clrMapOvr>
+</p:notes>
+</file>
+
 <file path=ppt/notesSlides/notesSlide6.xml><?xml version="1.0" encoding="utf-8"?>
 <p:notes xmlns:a="http://schemas.openxmlformats.org/drawingml/2006/main" xmlns:r="http://schemas.openxmlformats.org/officeDocument/2006/relationships" xmlns:p="http://schemas.openxmlformats.org/presentationml/2006/main">
   <p:cSld>
@@ -5581,7 +5667,7 @@
           <a:p>
             <a:fld id="{806D3CA2-0BB0-B649-A9F8-D66E4291C7D9}" type="datetime1">
               <a:rPr lang="en-US" smtClean="0"/>
-              <a:t>1/28/17</a:t>
+              <a:t>10/30/17</a:t>
             </a:fld>
             <a:endParaRPr lang="en-US"/>
           </a:p>
@@ -5751,7 +5837,7 @@
           <a:p>
             <a:fld id="{3089ADF2-A395-8242-9697-D2989F7B65A9}" type="datetime1">
               <a:rPr lang="en-US" smtClean="0"/>
-              <a:t>1/28/17</a:t>
+              <a:t>10/30/17</a:t>
             </a:fld>
             <a:endParaRPr lang="en-US"/>
           </a:p>
@@ -5931,7 +6017,7 @@
           <a:p>
             <a:fld id="{AC83ADC2-C45F-D045-8886-0B262120C175}" type="datetime1">
               <a:rPr lang="en-US" smtClean="0"/>
-              <a:t>1/28/17</a:t>
+              <a:t>10/30/17</a:t>
             </a:fld>
             <a:endParaRPr lang="en-US"/>
           </a:p>
@@ -6080,7 +6166,7 @@
           <a:p>
             <a:fld id="{7CA8F2E2-1E60-6344-958D-70C437E89490}" type="datetime1">
               <a:rPr lang="en-US" smtClean="0"/>
-              <a:t>1/28/17</a:t>
+              <a:t>10/30/17</a:t>
             </a:fld>
             <a:endParaRPr lang="en-US"/>
           </a:p>
@@ -6250,7 +6336,7 @@
           <a:p>
             <a:fld id="{2AB5BD50-0439-7F48-8AEA-76B395A0E4C9}" type="datetime1">
               <a:rPr lang="en-US" smtClean="0"/>
-              <a:t>1/28/17</a:t>
+              <a:t>10/30/17</a:t>
             </a:fld>
             <a:endParaRPr lang="en-US"/>
           </a:p>
@@ -6496,7 +6582,7 @@
           <a:p>
             <a:fld id="{1CD5C6F3-CEC4-EF4D-89AA-B32CB6F95133}" type="datetime1">
               <a:rPr lang="en-US" smtClean="0"/>
-              <a:t>1/28/17</a:t>
+              <a:t>10/30/17</a:t>
             </a:fld>
             <a:endParaRPr lang="en-US"/>
           </a:p>
@@ -6728,7 +6814,7 @@
           <a:p>
             <a:fld id="{5F2A4230-1B89-8F4A-8BAA-6B15473F7992}" type="datetime1">
               <a:rPr lang="en-US" smtClean="0"/>
-              <a:t>1/28/17</a:t>
+              <a:t>10/30/17</a:t>
             </a:fld>
             <a:endParaRPr lang="en-US"/>
           </a:p>
@@ -7095,7 +7181,7 @@
           <a:p>
             <a:fld id="{D24DE362-FEB8-A347-ACF9-C5B9E463437E}" type="datetime1">
               <a:rPr lang="en-US" smtClean="0"/>
-              <a:t>1/28/17</a:t>
+              <a:t>10/30/17</a:t>
             </a:fld>
             <a:endParaRPr lang="en-US"/>
           </a:p>
@@ -7213,7 +7299,7 @@
           <a:p>
             <a:fld id="{A640E1E1-2838-E648-B599-CED978C58D57}" type="datetime1">
               <a:rPr lang="en-US" smtClean="0"/>
-              <a:t>1/28/17</a:t>
+              <a:t>10/30/17</a:t>
             </a:fld>
             <a:endParaRPr lang="en-US"/>
           </a:p>
@@ -7308,7 +7394,7 @@
           <a:p>
             <a:fld id="{B7C3782A-D590-0942-B988-AA86E3207685}" type="datetime1">
               <a:rPr lang="en-US" smtClean="0"/>
-              <a:t>1/28/17</a:t>
+              <a:t>10/30/17</a:t>
             </a:fld>
             <a:endParaRPr lang="en-US"/>
           </a:p>
@@ -7585,7 +7671,7 @@
           <a:p>
             <a:fld id="{D01BF516-BBBE-1345-9C48-A2A1202B5221}" type="datetime1">
               <a:rPr lang="en-US" smtClean="0"/>
-              <a:t>1/28/17</a:t>
+              <a:t>10/30/17</a:t>
             </a:fld>
             <a:endParaRPr lang="en-US"/>
           </a:p>
@@ -7838,7 +7924,7 @@
           <a:p>
             <a:fld id="{D5207E6E-F1FB-1040-9727-8E1114EC23FC}" type="datetime1">
               <a:rPr lang="en-US" smtClean="0"/>
-              <a:t>1/28/17</a:t>
+              <a:t>10/30/17</a:t>
             </a:fld>
             <a:endParaRPr lang="en-US"/>
           </a:p>
@@ -8051,7 +8137,7 @@
           <a:p>
             <a:fld id="{BA77C152-CA6F-FE47-BC89-E0C4C804A194}" type="datetime1">
               <a:rPr lang="en-US" smtClean="0"/>
-              <a:t>1/28/17</a:t>
+              <a:t>10/30/17</a:t>
             </a:fld>
             <a:endParaRPr lang="en-US"/>
           </a:p>
@@ -8564,8 +8650,27 @@
                 <a:ea typeface="Avenir Book" charset="0"/>
                 <a:cs typeface="Avenir Book" charset="0"/>
               </a:rPr>
-              <a:t>Spring 2017</a:t>
-            </a:r>
+              <a:t>Spring </a:t>
+            </a:r>
+            <a:r>
+              <a:rPr lang="is-IS" sz="2000" dirty="0" smtClean="0">
+                <a:solidFill>
+                  <a:schemeClr val="tx2"/>
+                </a:solidFill>
+                <a:latin typeface="Avenir Book" charset="0"/>
+                <a:ea typeface="Avenir Book" charset="0"/>
+                <a:cs typeface="Avenir Book" charset="0"/>
+              </a:rPr>
+              <a:t>2018</a:t>
+            </a:r>
+            <a:endParaRPr lang="en-US" sz="2000" dirty="0" smtClean="0">
+              <a:solidFill>
+                <a:schemeClr val="tx2"/>
+              </a:solidFill>
+              <a:latin typeface="Avenir Book" charset="0"/>
+              <a:ea typeface="Avenir Book" charset="0"/>
+              <a:cs typeface="Avenir Book" charset="0"/>
+            </a:endParaRPr>
           </a:p>
           <a:p>
             <a:endParaRPr lang="en-US" sz="2000" dirty="0">
@@ -8587,7 +8692,18 @@
                 <a:ea typeface="Avenir Book" charset="0"/>
                 <a:cs typeface="Avenir Book" charset="0"/>
               </a:rPr>
-              <a:t>Jeff Chen + Dan Hammer</a:t>
+              <a:t>Jeff </a:t>
+            </a:r>
+            <a:r>
+              <a:rPr lang="en-US" sz="2000" dirty="0" smtClean="0">
+                <a:solidFill>
+                  <a:schemeClr val="tx2"/>
+                </a:solidFill>
+                <a:latin typeface="Avenir Book" charset="0"/>
+                <a:ea typeface="Avenir Book" charset="0"/>
+                <a:cs typeface="Avenir Book" charset="0"/>
+              </a:rPr>
+              <a:t>Chen</a:t>
             </a:r>
             <a:endParaRPr lang="en-US" sz="2000" dirty="0">
               <a:solidFill>
@@ -9699,10 +9815,10 @@
                 <a:ea typeface="Avenir Book" charset="0"/>
                 <a:cs typeface="Avenir Book" charset="0"/>
               </a:rPr>
-              <a:t>Intro to Data Science for Public Policy</a:t>
-            </a:r>
-            <a:r>
-              <a:rPr lang="en-US" smtClean="0">
+              <a:t>Intro to Data Science for Public Policy, Spring </a:t>
+            </a:r>
+            <a:r>
+              <a:rPr lang="is-IS" dirty="0" smtClean="0">
                 <a:solidFill>
                   <a:schemeClr val="bg1">
                     <a:lumMod val="75000"/>
@@ -9712,7 +9828,7 @@
                 <a:ea typeface="Avenir Book" charset="0"/>
                 <a:cs typeface="Avenir Book" charset="0"/>
               </a:rPr>
-              <a:t>, Spring 2017</a:t>
+              <a:t>2018</a:t>
             </a:r>
             <a:endParaRPr lang="en-US" dirty="0">
               <a:solidFill>
@@ -13049,10 +13165,10 @@
                 <a:ea typeface="Avenir Book" charset="0"/>
                 <a:cs typeface="Avenir Book" charset="0"/>
               </a:rPr>
-              <a:t>Intro to Data Science for Public Policy</a:t>
-            </a:r>
-            <a:r>
-              <a:rPr lang="en-US" smtClean="0">
+              <a:t>Intro to Data Science for Public Policy, Spring </a:t>
+            </a:r>
+            <a:r>
+              <a:rPr lang="is-IS" dirty="0" smtClean="0">
                 <a:solidFill>
                   <a:schemeClr val="bg1">
                     <a:lumMod val="75000"/>
@@ -13062,7 +13178,7 @@
                 <a:ea typeface="Avenir Book" charset="0"/>
                 <a:cs typeface="Avenir Book" charset="0"/>
               </a:rPr>
-              <a:t>, Spring 2017</a:t>
+              <a:t>2018</a:t>
             </a:r>
             <a:endParaRPr lang="en-US" dirty="0">
               <a:solidFill>
@@ -25925,7 +26041,15 @@
                 <a:ea typeface="Courier New" charset="0"/>
                 <a:cs typeface="Courier New" charset="0"/>
               </a:rPr>
-              <a:t>(var1 </a:t>
+              <a:t>(var1 = 	round(</a:t>
+            </a:r>
+            <a:r>
+              <a:rPr lang="en-US" sz="2400" dirty="0" err="1" smtClean="0">
+                <a:latin typeface="Courier New" charset="0"/>
+                <a:ea typeface="Courier New" charset="0"/>
+                <a:cs typeface="Courier New" charset="0"/>
+              </a:rPr>
+              <a:t>rnorm</a:t>
             </a:r>
             <a:r>
               <a:rPr lang="en-US" sz="2400" dirty="0" smtClean="0">
@@ -25933,7 +26057,18 @@
                 <a:ea typeface="Courier New" charset="0"/>
                 <a:cs typeface="Courier New" charset="0"/>
               </a:rPr>
-              <a:t>= 	round(</a:t>
+              <a:t>(100,1000,100)),</a:t>
+            </a:r>
+          </a:p>
+          <a:p>
+            <a:pPr marL="571500" indent="-571500"/>
+            <a:r>
+              <a:rPr lang="en-US" sz="2400" dirty="0" smtClean="0">
+                <a:latin typeface="Courier New" charset="0"/>
+                <a:ea typeface="Courier New" charset="0"/>
+                <a:cs typeface="Courier New" charset="0"/>
+              </a:rPr>
+              <a:t>				 group1 = round(</a:t>
             </a:r>
             <a:r>
               <a:rPr lang="en-US" sz="2400" dirty="0" err="1" smtClean="0">
@@ -25941,7 +26076,7 @@
                 <a:ea typeface="Courier New" charset="0"/>
                 <a:cs typeface="Courier New" charset="0"/>
               </a:rPr>
-              <a:t>rnorm</a:t>
+              <a:t>runif</a:t>
             </a:r>
             <a:r>
               <a:rPr lang="en-US" sz="2400" dirty="0" smtClean="0">
@@ -25949,64 +26084,8 @@
                 <a:ea typeface="Courier New" charset="0"/>
                 <a:cs typeface="Courier New" charset="0"/>
               </a:rPr>
-              <a:t>(100,1000,100)),</a:t>
-            </a:r>
-          </a:p>
-          <a:p>
-            <a:pPr marL="571500" indent="-571500"/>
-            <a:r>
-              <a:rPr lang="en-US" sz="2400" dirty="0" smtClean="0">
-                <a:latin typeface="Courier New" charset="0"/>
-                <a:ea typeface="Courier New" charset="0"/>
-                <a:cs typeface="Courier New" charset="0"/>
-              </a:rPr>
-              <a:t>				 </a:t>
-            </a:r>
-            <a:r>
-              <a:rPr lang="en-US" sz="2400" dirty="0" smtClean="0">
-                <a:latin typeface="Courier New" charset="0"/>
-                <a:ea typeface="Courier New" charset="0"/>
-                <a:cs typeface="Courier New" charset="0"/>
-              </a:rPr>
-              <a:t>group1 </a:t>
-            </a:r>
-            <a:r>
-              <a:rPr lang="en-US" sz="2400" dirty="0" smtClean="0">
-                <a:latin typeface="Courier New" charset="0"/>
-                <a:ea typeface="Courier New" charset="0"/>
-                <a:cs typeface="Courier New" charset="0"/>
-              </a:rPr>
-              <a:t>= </a:t>
-            </a:r>
-            <a:r>
-              <a:rPr lang="en-US" sz="2400" dirty="0" smtClean="0">
-                <a:latin typeface="Courier New" charset="0"/>
-                <a:ea typeface="Courier New" charset="0"/>
-                <a:cs typeface="Courier New" charset="0"/>
-              </a:rPr>
-              <a:t>round(</a:t>
-            </a:r>
-            <a:r>
-              <a:rPr lang="en-US" sz="2400" dirty="0" err="1" smtClean="0">
-                <a:latin typeface="Courier New" charset="0"/>
-                <a:ea typeface="Courier New" charset="0"/>
-                <a:cs typeface="Courier New" charset="0"/>
-              </a:rPr>
-              <a:t>runif</a:t>
-            </a:r>
-            <a:r>
-              <a:rPr lang="en-US" sz="2400" dirty="0" smtClean="0">
-                <a:latin typeface="Courier New" charset="0"/>
-                <a:ea typeface="Courier New" charset="0"/>
-                <a:cs typeface="Courier New" charset="0"/>
-              </a:rPr>
               <a:t>(100)*5))</a:t>
             </a:r>
-            <a:endParaRPr lang="en-US" sz="2400" dirty="0" smtClean="0">
-              <a:latin typeface="Courier New" charset="0"/>
-              <a:ea typeface="Courier New" charset="0"/>
-              <a:cs typeface="Courier New" charset="0"/>
-            </a:endParaRPr>
           </a:p>
           <a:p>
             <a:pPr marL="571500" indent="-571500"/>
@@ -37305,10 +37384,10 @@
                 <a:ea typeface="Avenir Book" charset="0"/>
                 <a:cs typeface="Avenir Book" charset="0"/>
               </a:rPr>
-              <a:t>Intro to Data Science for Public Policy</a:t>
-            </a:r>
-            <a:r>
-              <a:rPr lang="en-US" smtClean="0">
+              <a:t>Intro to Data Science for Public Policy, Spring </a:t>
+            </a:r>
+            <a:r>
+              <a:rPr lang="is-IS" dirty="0" smtClean="0">
                 <a:solidFill>
                   <a:schemeClr val="bg1">
                     <a:lumMod val="75000"/>
@@ -37318,7 +37397,7 @@
                 <a:ea typeface="Avenir Book" charset="0"/>
                 <a:cs typeface="Avenir Book" charset="0"/>
               </a:rPr>
-              <a:t>, Spring 2017</a:t>
+              <a:t>2018</a:t>
             </a:r>
             <a:endParaRPr lang="en-US" dirty="0">
               <a:solidFill>
@@ -37334,6 +37413,330 @@
     <p:extLst>
       <p:ext uri="{BB962C8B-B14F-4D97-AF65-F5344CB8AC3E}">
         <p14:creationId xmlns:p14="http://schemas.microsoft.com/office/powerpoint/2010/main" val="425373423"/>
+      </p:ext>
+    </p:extLst>
+  </p:cSld>
+  <p:clrMapOvr>
+    <a:masterClrMapping/>
+  </p:clrMapOvr>
+  <p:timing>
+    <p:tnLst>
+      <p:par>
+        <p:cTn id="1" dur="indefinite" restart="never" nodeType="tmRoot"/>
+      </p:par>
+    </p:tnLst>
+  </p:timing>
+</p:sld>
+</file>
+
+<file path=ppt/slides/slide58.xml><?xml version="1.0" encoding="utf-8"?>
+<p:sld xmlns:a="http://schemas.openxmlformats.org/drawingml/2006/main" xmlns:r="http://schemas.openxmlformats.org/officeDocument/2006/relationships" xmlns:p="http://schemas.openxmlformats.org/presentationml/2006/main">
+  <p:cSld>
+    <p:spTree>
+      <p:nvGrpSpPr>
+        <p:cNvPr id="1" name=""/>
+        <p:cNvGrpSpPr/>
+        <p:nvPr/>
+      </p:nvGrpSpPr>
+      <p:grpSpPr>
+        <a:xfrm>
+          <a:off x="0" y="0"/>
+          <a:ext cx="0" cy="0"/>
+          <a:chOff x="0" y="0"/>
+          <a:chExt cx="0" cy="0"/>
+        </a:xfrm>
+      </p:grpSpPr>
+      <p:sp>
+        <p:nvSpPr>
+          <p:cNvPr id="2" name="Slide Number Placeholder 1"/>
+          <p:cNvSpPr>
+            <a:spLocks noGrp="1"/>
+          </p:cNvSpPr>
+          <p:nvPr>
+            <p:ph type="sldNum" sz="quarter" idx="12"/>
+          </p:nvPr>
+        </p:nvSpPr>
+        <p:spPr>
+          <a:xfrm>
+            <a:off x="8510270" y="6373821"/>
+            <a:ext cx="2743200" cy="365125"/>
+          </a:xfrm>
+        </p:spPr>
+        <p:txBody>
+          <a:bodyPr/>
+          <a:lstStyle/>
+          <a:p>
+            <a:fld id="{150819AE-02FA-3749-BFC2-030922A62D98}" type="slidenum">
+              <a:rPr lang="en-US" smtClean="0"/>
+              <a:t>58</a:t>
+            </a:fld>
+            <a:endParaRPr lang="en-US"/>
+          </a:p>
+        </p:txBody>
+      </p:sp>
+      <p:sp>
+        <p:nvSpPr>
+          <p:cNvPr id="6" name="Rectangle 5"/>
+          <p:cNvSpPr/>
+          <p:nvPr/>
+        </p:nvSpPr>
+        <p:spPr>
+          <a:xfrm>
+            <a:off x="361950" y="6317253"/>
+            <a:ext cx="8953500" cy="461665"/>
+          </a:xfrm>
+          <a:prstGeom prst="rect">
+            <a:avLst/>
+          </a:prstGeom>
+        </p:spPr>
+        <p:txBody>
+          <a:bodyPr wrap="square">
+            <a:spAutoFit/>
+          </a:bodyPr>
+          <a:lstStyle/>
+          <a:p>
+            <a:pPr marL="17463" marR="0" lvl="0" indent="-17463" defTabSz="914400" eaLnBrk="1" fontAlgn="auto" latinLnBrk="0" hangingPunct="1">
+              <a:lnSpc>
+                <a:spcPct val="100000"/>
+              </a:lnSpc>
+              <a:spcBef>
+                <a:spcPts val="0"/>
+              </a:spcBef>
+              <a:spcAft>
+                <a:spcPts val="0"/>
+              </a:spcAft>
+              <a:buClrTx/>
+              <a:buSzTx/>
+              <a:buFont typeface="Arial" charset="0"/>
+              <a:buNone/>
+              <a:defRPr/>
+            </a:pPr>
+            <a:r>
+              <a:rPr lang="en-US" sz="2400" dirty="0" smtClean="0">
+                <a:solidFill>
+                  <a:schemeClr val="bg1">
+                    <a:lumMod val="50000"/>
+                  </a:schemeClr>
+                </a:solidFill>
+                <a:latin typeface="Helvetica Neue Thin" charset="0"/>
+                <a:ea typeface="Helvetica Neue Thin" charset="0"/>
+                <a:cs typeface="Helvetica Neue Thin" charset="0"/>
+              </a:rPr>
+              <a:t>Assignments</a:t>
+            </a:r>
+            <a:endParaRPr lang="en-US" sz="2400" dirty="0">
+              <a:solidFill>
+                <a:schemeClr val="bg1">
+                  <a:lumMod val="50000"/>
+                </a:schemeClr>
+              </a:solidFill>
+              <a:latin typeface="Helvetica Neue Thin" charset="0"/>
+              <a:ea typeface="Helvetica Neue Thin" charset="0"/>
+              <a:cs typeface="Helvetica Neue Thin" charset="0"/>
+            </a:endParaRPr>
+          </a:p>
+        </p:txBody>
+      </p:sp>
+      <p:sp>
+        <p:nvSpPr>
+          <p:cNvPr id="21" name="Rectangle 20"/>
+          <p:cNvSpPr/>
+          <p:nvPr/>
+        </p:nvSpPr>
+        <p:spPr>
+          <a:xfrm>
+            <a:off x="1028700" y="1841040"/>
+            <a:ext cx="11163299" cy="2400657"/>
+          </a:xfrm>
+          <a:prstGeom prst="rect">
+            <a:avLst/>
+          </a:prstGeom>
+        </p:spPr>
+        <p:txBody>
+          <a:bodyPr wrap="square">
+            <a:spAutoFit/>
+          </a:bodyPr>
+          <a:lstStyle/>
+          <a:p>
+            <a:pPr marL="685800" indent="-685800">
+              <a:lnSpc>
+                <a:spcPct val="150000"/>
+              </a:lnSpc>
+              <a:buFont typeface="Arial" charset="0"/>
+              <a:buChar char="•"/>
+            </a:pPr>
+            <a:r>
+              <a:rPr lang="en-US" sz="3600" dirty="0" smtClean="0">
+                <a:solidFill>
+                  <a:schemeClr val="accent1">
+                    <a:lumMod val="75000"/>
+                  </a:schemeClr>
+                </a:solidFill>
+                <a:latin typeface="Helvetica Neue Thin" charset="0"/>
+                <a:ea typeface="Helvetica Neue Thin" charset="0"/>
+                <a:cs typeface="Helvetica Neue Thin" charset="0"/>
+              </a:rPr>
+              <a:t>Review Chapter </a:t>
+            </a:r>
+            <a:r>
+              <a:rPr lang="en-US" sz="3600" dirty="0" smtClean="0">
+                <a:solidFill>
+                  <a:schemeClr val="accent1">
+                    <a:lumMod val="75000"/>
+                  </a:schemeClr>
+                </a:solidFill>
+                <a:latin typeface="Helvetica Neue Thin" charset="0"/>
+                <a:ea typeface="Helvetica Neue Thin" charset="0"/>
+                <a:cs typeface="Helvetica Neue Thin" charset="0"/>
+              </a:rPr>
+              <a:t>2 </a:t>
+            </a:r>
+            <a:r>
+              <a:rPr lang="en-US" sz="3600" dirty="0">
+                <a:solidFill>
+                  <a:schemeClr val="accent1">
+                    <a:lumMod val="75000"/>
+                  </a:schemeClr>
+                </a:solidFill>
+                <a:latin typeface="Helvetica Neue Thin" charset="0"/>
+                <a:ea typeface="Helvetica Neue Thin" charset="0"/>
+                <a:cs typeface="Helvetica Neue Thin" charset="0"/>
+              </a:rPr>
+              <a:t>at: </a:t>
+            </a:r>
+            <a:r>
+              <a:rPr lang="en-US" sz="2800" b="1" dirty="0">
+                <a:solidFill>
+                  <a:schemeClr val="accent1">
+                    <a:lumMod val="75000"/>
+                  </a:schemeClr>
+                </a:solidFill>
+                <a:latin typeface="Helvetica Neue Thin" charset="0"/>
+                <a:ea typeface="Helvetica Neue Thin" charset="0"/>
+                <a:cs typeface="Helvetica Neue Thin" charset="0"/>
+                <a:hlinkClick r:id="rId3"/>
+              </a:rPr>
+              <a:t>https://georgetownmccourt.github.io/data-science</a:t>
+            </a:r>
+            <a:r>
+              <a:rPr lang="en-US" sz="2800" b="1" dirty="0" smtClean="0">
+                <a:solidFill>
+                  <a:schemeClr val="accent1">
+                    <a:lumMod val="75000"/>
+                  </a:schemeClr>
+                </a:solidFill>
+                <a:latin typeface="Helvetica Neue Thin" charset="0"/>
+                <a:ea typeface="Helvetica Neue Thin" charset="0"/>
+                <a:cs typeface="Helvetica Neue Thin" charset="0"/>
+                <a:hlinkClick r:id="rId3"/>
+              </a:rPr>
+              <a:t>/</a:t>
+            </a:r>
+            <a:r>
+              <a:rPr lang="en-US" sz="2800" b="1" dirty="0" smtClean="0">
+                <a:solidFill>
+                  <a:schemeClr val="accent1">
+                    <a:lumMod val="75000"/>
+                  </a:schemeClr>
+                </a:solidFill>
+                <a:latin typeface="Helvetica Neue Thin" charset="0"/>
+                <a:ea typeface="Helvetica Neue Thin" charset="0"/>
+                <a:cs typeface="Helvetica Neue Thin" charset="0"/>
+              </a:rPr>
+              <a:t> </a:t>
+            </a:r>
+            <a:endParaRPr lang="en-US" sz="3600" b="1" dirty="0" smtClean="0">
+              <a:solidFill>
+                <a:schemeClr val="accent1">
+                  <a:lumMod val="75000"/>
+                </a:schemeClr>
+              </a:solidFill>
+              <a:latin typeface="Helvetica Neue Thin" charset="0"/>
+              <a:ea typeface="Helvetica Neue Thin" charset="0"/>
+              <a:cs typeface="Helvetica Neue Thin" charset="0"/>
+            </a:endParaRPr>
+          </a:p>
+          <a:p>
+            <a:pPr marL="685800" indent="-685800">
+              <a:lnSpc>
+                <a:spcPct val="150000"/>
+              </a:lnSpc>
+              <a:buFont typeface="Arial" charset="0"/>
+              <a:buChar char="•"/>
+            </a:pPr>
+            <a:r>
+              <a:rPr lang="en-US" sz="3600" dirty="0" smtClean="0">
+                <a:solidFill>
+                  <a:schemeClr val="accent1">
+                    <a:lumMod val="75000"/>
+                  </a:schemeClr>
+                </a:solidFill>
+                <a:latin typeface="Helvetica Neue Thin" charset="0"/>
+                <a:ea typeface="Helvetica Neue Thin" charset="0"/>
+                <a:cs typeface="Helvetica Neue Thin" charset="0"/>
+              </a:rPr>
+              <a:t>Homework #1 will be available via Blackboard</a:t>
+            </a:r>
+            <a:endParaRPr lang="en-US" sz="3600" dirty="0" smtClean="0">
+              <a:solidFill>
+                <a:schemeClr val="accent1">
+                  <a:lumMod val="75000"/>
+                </a:schemeClr>
+              </a:solidFill>
+              <a:latin typeface="Helvetica Neue Thin" charset="0"/>
+              <a:ea typeface="Helvetica Neue Thin" charset="0"/>
+              <a:cs typeface="Helvetica Neue Thin" charset="0"/>
+            </a:endParaRPr>
+          </a:p>
+        </p:txBody>
+      </p:sp>
+      <p:sp>
+        <p:nvSpPr>
+          <p:cNvPr id="7" name="Rectangle 6"/>
+          <p:cNvSpPr/>
+          <p:nvPr/>
+        </p:nvSpPr>
+        <p:spPr>
+          <a:xfrm>
+            <a:off x="1028700" y="953475"/>
+            <a:ext cx="10782300" cy="830997"/>
+          </a:xfrm>
+          <a:prstGeom prst="rect">
+            <a:avLst/>
+          </a:prstGeom>
+        </p:spPr>
+        <p:txBody>
+          <a:bodyPr wrap="square">
+            <a:spAutoFit/>
+          </a:bodyPr>
+          <a:lstStyle/>
+          <a:p>
+            <a:r>
+              <a:rPr lang="en-US" sz="4800" dirty="0" smtClean="0">
+                <a:solidFill>
+                  <a:srgbClr val="00B0F0"/>
+                </a:solidFill>
+                <a:latin typeface="Helvetica Neue Thin" charset="0"/>
+                <a:ea typeface="Helvetica Neue Thin" charset="0"/>
+                <a:cs typeface="Helvetica Neue Thin" charset="0"/>
+              </a:rPr>
+              <a:t>To Do For Next Class</a:t>
+            </a:r>
+            <a:endParaRPr lang="en-US" sz="4800" dirty="0">
+              <a:solidFill>
+                <a:srgbClr val="00B0F0"/>
+              </a:solidFill>
+              <a:latin typeface="Helvetica Neue Thin" charset="0"/>
+              <a:ea typeface="Helvetica Neue Thin" charset="0"/>
+              <a:cs typeface="Helvetica Neue Thin" charset="0"/>
+            </a:endParaRPr>
+          </a:p>
+        </p:txBody>
+      </p:sp>
+    </p:spTree>
+    <p:extLst>
+      <p:ext uri="{BB962C8B-B14F-4D97-AF65-F5344CB8AC3E}">
+        <p14:creationId xmlns:p14="http://schemas.microsoft.com/office/powerpoint/2010/main" val="757655800"/>
       </p:ext>
     </p:extLst>
   </p:cSld>

</xml_diff>

<commit_message>
Updated lecture 2 package
zip
</commit_message>
<xml_diff>
--- a/lecture-02/slides.pptx
+++ b/lecture-02/slides.pptx
@@ -320,7 +320,7 @@
           <a:p>
             <a:fld id="{18E57C98-52D9-9D49-A4E0-A36F13E19F71}" type="datetimeFigureOut">
               <a:rPr lang="en-US" smtClean="0"/>
-              <a:t>10/30/17</a:t>
+              <a:t>1/21/18</a:t>
             </a:fld>
             <a:endParaRPr lang="en-US"/>
           </a:p>
@@ -5667,7 +5667,7 @@
           <a:p>
             <a:fld id="{806D3CA2-0BB0-B649-A9F8-D66E4291C7D9}" type="datetime1">
               <a:rPr lang="en-US" smtClean="0"/>
-              <a:t>10/30/17</a:t>
+              <a:t>1/21/18</a:t>
             </a:fld>
             <a:endParaRPr lang="en-US"/>
           </a:p>
@@ -5837,7 +5837,7 @@
           <a:p>
             <a:fld id="{3089ADF2-A395-8242-9697-D2989F7B65A9}" type="datetime1">
               <a:rPr lang="en-US" smtClean="0"/>
-              <a:t>10/30/17</a:t>
+              <a:t>1/21/18</a:t>
             </a:fld>
             <a:endParaRPr lang="en-US"/>
           </a:p>
@@ -6017,7 +6017,7 @@
           <a:p>
             <a:fld id="{AC83ADC2-C45F-D045-8886-0B262120C175}" type="datetime1">
               <a:rPr lang="en-US" smtClean="0"/>
-              <a:t>10/30/17</a:t>
+              <a:t>1/21/18</a:t>
             </a:fld>
             <a:endParaRPr lang="en-US"/>
           </a:p>
@@ -6166,7 +6166,7 @@
           <a:p>
             <a:fld id="{7CA8F2E2-1E60-6344-958D-70C437E89490}" type="datetime1">
               <a:rPr lang="en-US" smtClean="0"/>
-              <a:t>10/30/17</a:t>
+              <a:t>1/21/18</a:t>
             </a:fld>
             <a:endParaRPr lang="en-US"/>
           </a:p>
@@ -6336,7 +6336,7 @@
           <a:p>
             <a:fld id="{2AB5BD50-0439-7F48-8AEA-76B395A0E4C9}" type="datetime1">
               <a:rPr lang="en-US" smtClean="0"/>
-              <a:t>10/30/17</a:t>
+              <a:t>1/21/18</a:t>
             </a:fld>
             <a:endParaRPr lang="en-US"/>
           </a:p>
@@ -6582,7 +6582,7 @@
           <a:p>
             <a:fld id="{1CD5C6F3-CEC4-EF4D-89AA-B32CB6F95133}" type="datetime1">
               <a:rPr lang="en-US" smtClean="0"/>
-              <a:t>10/30/17</a:t>
+              <a:t>1/21/18</a:t>
             </a:fld>
             <a:endParaRPr lang="en-US"/>
           </a:p>
@@ -6814,7 +6814,7 @@
           <a:p>
             <a:fld id="{5F2A4230-1B89-8F4A-8BAA-6B15473F7992}" type="datetime1">
               <a:rPr lang="en-US" smtClean="0"/>
-              <a:t>10/30/17</a:t>
+              <a:t>1/21/18</a:t>
             </a:fld>
             <a:endParaRPr lang="en-US"/>
           </a:p>
@@ -7181,7 +7181,7 @@
           <a:p>
             <a:fld id="{D24DE362-FEB8-A347-ACF9-C5B9E463437E}" type="datetime1">
               <a:rPr lang="en-US" smtClean="0"/>
-              <a:t>10/30/17</a:t>
+              <a:t>1/21/18</a:t>
             </a:fld>
             <a:endParaRPr lang="en-US"/>
           </a:p>
@@ -7299,7 +7299,7 @@
           <a:p>
             <a:fld id="{A640E1E1-2838-E648-B599-CED978C58D57}" type="datetime1">
               <a:rPr lang="en-US" smtClean="0"/>
-              <a:t>10/30/17</a:t>
+              <a:t>1/21/18</a:t>
             </a:fld>
             <a:endParaRPr lang="en-US"/>
           </a:p>
@@ -7394,7 +7394,7 @@
           <a:p>
             <a:fld id="{B7C3782A-D590-0942-B988-AA86E3207685}" type="datetime1">
               <a:rPr lang="en-US" smtClean="0"/>
-              <a:t>10/30/17</a:t>
+              <a:t>1/21/18</a:t>
             </a:fld>
             <a:endParaRPr lang="en-US"/>
           </a:p>
@@ -7671,7 +7671,7 @@
           <a:p>
             <a:fld id="{D01BF516-BBBE-1345-9C48-A2A1202B5221}" type="datetime1">
               <a:rPr lang="en-US" smtClean="0"/>
-              <a:t>10/30/17</a:t>
+              <a:t>1/21/18</a:t>
             </a:fld>
             <a:endParaRPr lang="en-US"/>
           </a:p>
@@ -7924,7 +7924,7 @@
           <a:p>
             <a:fld id="{D5207E6E-F1FB-1040-9727-8E1114EC23FC}" type="datetime1">
               <a:rPr lang="en-US" smtClean="0"/>
-              <a:t>10/30/17</a:t>
+              <a:t>1/21/18</a:t>
             </a:fld>
             <a:endParaRPr lang="en-US"/>
           </a:p>
@@ -8137,7 +8137,7 @@
           <a:p>
             <a:fld id="{BA77C152-CA6F-FE47-BC89-E0C4C804A194}" type="datetime1">
               <a:rPr lang="en-US" smtClean="0"/>
-              <a:t>10/30/17</a:t>
+              <a:t>1/21/18</a:t>
             </a:fld>
             <a:endParaRPr lang="en-US"/>
           </a:p>
@@ -8692,18 +8692,7 @@
                 <a:ea typeface="Avenir Book" charset="0"/>
                 <a:cs typeface="Avenir Book" charset="0"/>
               </a:rPr>
-              <a:t>Jeff </a:t>
-            </a:r>
-            <a:r>
-              <a:rPr lang="en-US" sz="2000" dirty="0" smtClean="0">
-                <a:solidFill>
-                  <a:schemeClr val="tx2"/>
-                </a:solidFill>
-                <a:latin typeface="Avenir Book" charset="0"/>
-                <a:ea typeface="Avenir Book" charset="0"/>
-                <a:cs typeface="Avenir Book" charset="0"/>
-              </a:rPr>
-              <a:t>Chen</a:t>
+              <a:t>Jeff Chen</a:t>
             </a:r>
             <a:endParaRPr lang="en-US" sz="2000" dirty="0">
               <a:solidFill>
@@ -13002,7 +12991,7 @@
         <p:spPr>
           <a:xfrm>
             <a:off x="1460282" y="1886823"/>
-            <a:ext cx="9226768" cy="2862322"/>
+            <a:ext cx="9226768" cy="3416320"/>
           </a:xfrm>
           <a:prstGeom prst="rect">
             <a:avLst/>
@@ -13020,7 +13009,36 @@
               <a:buChar char="•"/>
             </a:pPr>
             <a:r>
-              <a:rPr lang="en-US" sz="3600" b="1" dirty="0">
+              <a:rPr lang="en-US" sz="3600" smtClean="0">
+                <a:solidFill>
+                  <a:schemeClr val="bg1">
+                    <a:lumMod val="65000"/>
+                  </a:schemeClr>
+                </a:solidFill>
+                <a:latin typeface="Avenir Book" charset="0"/>
+                <a:ea typeface="Avenir Book" charset="0"/>
+                <a:cs typeface="Avenir Book" charset="0"/>
+              </a:rPr>
+              <a:t>Homework #0</a:t>
+            </a:r>
+            <a:endParaRPr lang="en-US" sz="3600">
+              <a:solidFill>
+                <a:schemeClr val="bg1">
+                  <a:lumMod val="65000"/>
+                </a:schemeClr>
+              </a:solidFill>
+              <a:latin typeface="Avenir Book" charset="0"/>
+              <a:ea typeface="Avenir Book" charset="0"/>
+              <a:cs typeface="Avenir Book" charset="0"/>
+            </a:endParaRPr>
+          </a:p>
+          <a:p>
+            <a:pPr marL="571500" indent="-571500">
+              <a:buFont typeface="Arial" charset="0"/>
+              <a:buChar char="•"/>
+            </a:pPr>
+            <a:r>
+              <a:rPr lang="en-US" sz="3600" b="1" dirty="0" smtClean="0">
                 <a:solidFill>
                   <a:schemeClr val="tx2"/>
                 </a:solidFill>
@@ -37576,7 +37594,7 @@
                 <a:ea typeface="Helvetica Neue Thin" charset="0"/>
                 <a:cs typeface="Helvetica Neue Thin" charset="0"/>
               </a:rPr>
-              <a:t>Review Chapter </a:t>
+              <a:t>Review </a:t>
             </a:r>
             <a:r>
               <a:rPr lang="en-US" sz="3600" dirty="0" smtClean="0">
@@ -37589,7 +37607,20 @@
                 <a:ea typeface="Helvetica Neue Thin" charset="0"/>
                 <a:cs typeface="Helvetica Neue Thin" charset="0"/>
               </a:rPr>
-              <a:t>2 </a:t>
+              <a:t>Lecture </a:t>
+            </a:r>
+            <a:r>
+              <a:rPr lang="en-US" sz="3600" dirty="0" smtClean="0">
+                <a:solidFill>
+                  <a:schemeClr val="accent1">
+                    <a:lumMod val="75000"/>
+                  </a:schemeClr>
+                </a:solidFill>
+                <a:latin typeface="Helvetica Neue Thin" charset="0"/>
+                <a:ea typeface="Helvetica Neue Thin" charset="0"/>
+                <a:cs typeface="Helvetica Neue Thin" charset="0"/>
+              </a:rPr>
+              <a:t>3 </a:t>
             </a:r>
             <a:r>
               <a:rPr lang="en-US" sz="3600" dirty="0">
@@ -37677,16 +37708,6 @@
               </a:rPr>
               <a:t>Homework #1 will be available via Blackboard</a:t>
             </a:r>
-            <a:endParaRPr lang="en-US" sz="3600" dirty="0" smtClean="0">
-              <a:solidFill>
-                <a:schemeClr val="accent1">
-                  <a:lumMod val="75000"/>
-                </a:schemeClr>
-              </a:solidFill>
-              <a:latin typeface="Helvetica Neue Thin" charset="0"/>
-              <a:ea typeface="Helvetica Neue Thin" charset="0"/>
-              <a:cs typeface="Helvetica Neue Thin" charset="0"/>
-            </a:endParaRPr>
           </a:p>
         </p:txBody>
       </p:sp>

</xml_diff>